<commit_message>
MCAP - Review 25/06
</commit_message>
<xml_diff>
--- a/TicTacToe.pptx
+++ b/TicTacToe.pptx
@@ -8,7 +8,9 @@
     <p:sldId id="256" r:id="rId2"/>
     <p:sldId id="259" r:id="rId3"/>
     <p:sldId id="257" r:id="rId4"/>
-    <p:sldId id="258" r:id="rId5"/>
+    <p:sldId id="260" r:id="rId5"/>
+    <p:sldId id="261" r:id="rId6"/>
+    <p:sldId id="258" r:id="rId7"/>
   </p:sldIdLst>
   <p:sldSz cx="12192000" cy="6858000"/>
   <p:notesSz cx="6858000" cy="9144000"/>
@@ -118,13 +120,346 @@
 <file path=ppt/revisionInfo.xml><?xml version="1.0" encoding="utf-8"?>
 <p1510:revInfo xmlns:a="http://schemas.openxmlformats.org/drawingml/2006/main" xmlns:r="http://schemas.openxmlformats.org/officeDocument/2006/relationships" xmlns:p1510="http://schemas.microsoft.com/office/powerpoint/2015/10/main">
   <p1510:revLst>
-    <p1510:client id="{34C09F10-C780-4E93-9DFA-357151B02302}" v="55" dt="2025-06-22T18:24:36.622"/>
+    <p1510:client id="{F43C46D6-B015-4FAD-804D-7D5EF1E1C2CB}" v="78" dt="2025-06-24T08:49:56.537"/>
   </p1510:revLst>
 </p1510:revInfo>
 </file>
 
 <file path=ppt/changesInfos/changesInfo1.xml><?xml version="1.0" encoding="utf-8"?>
 <pc:chgInfo xmlns:a="http://schemas.openxmlformats.org/drawingml/2006/main" xmlns:r="http://schemas.openxmlformats.org/officeDocument/2006/relationships" xmlns:ac="http://schemas.microsoft.com/office/drawing/2013/main/command" xmlns:pc="http://schemas.microsoft.com/office/powerpoint/2013/main/command">
+  <pc:docChgLst>
+    <pc:chgData name="Massimo Cappelli" userId="683e3799-a29a-42d8-9057-94b17eae4db3" providerId="ADAL" clId="{F43C46D6-B015-4FAD-804D-7D5EF1E1C2CB}"/>
+    <pc:docChg chg="undo custSel addSld modSld">
+      <pc:chgData name="Massimo Cappelli" userId="683e3799-a29a-42d8-9057-94b17eae4db3" providerId="ADAL" clId="{F43C46D6-B015-4FAD-804D-7D5EF1E1C2CB}" dt="2025-06-24T09:06:40.575" v="392"/>
+      <pc:docMkLst>
+        <pc:docMk/>
+      </pc:docMkLst>
+      <pc:sldChg chg="modSp mod">
+        <pc:chgData name="Massimo Cappelli" userId="683e3799-a29a-42d8-9057-94b17eae4db3" providerId="ADAL" clId="{F43C46D6-B015-4FAD-804D-7D5EF1E1C2CB}" dt="2025-06-24T09:06:40.575" v="392"/>
+        <pc:sldMkLst>
+          <pc:docMk/>
+          <pc:sldMk cId="2079438367" sldId="257"/>
+        </pc:sldMkLst>
+        <pc:spChg chg="mod">
+          <ac:chgData name="Massimo Cappelli" userId="683e3799-a29a-42d8-9057-94b17eae4db3" providerId="ADAL" clId="{F43C46D6-B015-4FAD-804D-7D5EF1E1C2CB}" dt="2025-06-24T09:06:40.575" v="392"/>
+          <ac:spMkLst>
+            <pc:docMk/>
+            <pc:sldMk cId="2079438367" sldId="257"/>
+            <ac:spMk id="9" creationId="{7D361273-CD5D-5767-94E8-E71FD8E114FB}"/>
+          </ac:spMkLst>
+        </pc:spChg>
+        <pc:spChg chg="mod">
+          <ac:chgData name="Massimo Cappelli" userId="683e3799-a29a-42d8-9057-94b17eae4db3" providerId="ADAL" clId="{F43C46D6-B015-4FAD-804D-7D5EF1E1C2CB}" dt="2025-06-24T09:06:40.575" v="392"/>
+          <ac:spMkLst>
+            <pc:docMk/>
+            <pc:sldMk cId="2079438367" sldId="257"/>
+            <ac:spMk id="10" creationId="{32E46342-A2B7-A5E0-5206-184B976FD828}"/>
+          </ac:spMkLst>
+        </pc:spChg>
+        <pc:spChg chg="mod">
+          <ac:chgData name="Massimo Cappelli" userId="683e3799-a29a-42d8-9057-94b17eae4db3" providerId="ADAL" clId="{F43C46D6-B015-4FAD-804D-7D5EF1E1C2CB}" dt="2025-06-24T09:06:40.575" v="392"/>
+          <ac:spMkLst>
+            <pc:docMk/>
+            <pc:sldMk cId="2079438367" sldId="257"/>
+            <ac:spMk id="11" creationId="{4CB84F12-4418-5850-52C3-A0AD5831FAEA}"/>
+          </ac:spMkLst>
+        </pc:spChg>
+        <pc:spChg chg="mod">
+          <ac:chgData name="Massimo Cappelli" userId="683e3799-a29a-42d8-9057-94b17eae4db3" providerId="ADAL" clId="{F43C46D6-B015-4FAD-804D-7D5EF1E1C2CB}" dt="2025-06-24T09:06:40.575" v="392"/>
+          <ac:spMkLst>
+            <pc:docMk/>
+            <pc:sldMk cId="2079438367" sldId="257"/>
+            <ac:spMk id="18" creationId="{706DFC33-4E3F-232C-9C68-C7864A283A5C}"/>
+          </ac:spMkLst>
+        </pc:spChg>
+        <pc:spChg chg="mod">
+          <ac:chgData name="Massimo Cappelli" userId="683e3799-a29a-42d8-9057-94b17eae4db3" providerId="ADAL" clId="{F43C46D6-B015-4FAD-804D-7D5EF1E1C2CB}" dt="2025-06-24T09:06:40.575" v="392"/>
+          <ac:spMkLst>
+            <pc:docMk/>
+            <pc:sldMk cId="2079438367" sldId="257"/>
+            <ac:spMk id="20" creationId="{455FF59F-09D8-8ABE-4EC6-AAA199E81A71}"/>
+          </ac:spMkLst>
+        </pc:spChg>
+        <pc:spChg chg="mod">
+          <ac:chgData name="Massimo Cappelli" userId="683e3799-a29a-42d8-9057-94b17eae4db3" providerId="ADAL" clId="{F43C46D6-B015-4FAD-804D-7D5EF1E1C2CB}" dt="2025-06-24T09:06:40.575" v="392"/>
+          <ac:spMkLst>
+            <pc:docMk/>
+            <pc:sldMk cId="2079438367" sldId="257"/>
+            <ac:spMk id="23" creationId="{E3A73D7E-1589-E339-0871-5D317C4D3FCE}"/>
+          </ac:spMkLst>
+        </pc:spChg>
+        <pc:spChg chg="mod">
+          <ac:chgData name="Massimo Cappelli" userId="683e3799-a29a-42d8-9057-94b17eae4db3" providerId="ADAL" clId="{F43C46D6-B015-4FAD-804D-7D5EF1E1C2CB}" dt="2025-06-24T09:06:40.575" v="392"/>
+          <ac:spMkLst>
+            <pc:docMk/>
+            <pc:sldMk cId="2079438367" sldId="257"/>
+            <ac:spMk id="26" creationId="{402808A7-1880-1497-D857-5AE1BD0675BF}"/>
+          </ac:spMkLst>
+        </pc:spChg>
+        <pc:cxnChg chg="mod">
+          <ac:chgData name="Massimo Cappelli" userId="683e3799-a29a-42d8-9057-94b17eae4db3" providerId="ADAL" clId="{F43C46D6-B015-4FAD-804D-7D5EF1E1C2CB}" dt="2025-06-24T09:06:40.575" v="391" actId="108"/>
+          <ac:cxnSpMkLst>
+            <pc:docMk/>
+            <pc:sldMk cId="2079438367" sldId="257"/>
+            <ac:cxnSpMk id="13" creationId="{9A07CF03-8AB2-17B3-420C-B6F5015C1F31}"/>
+          </ac:cxnSpMkLst>
+        </pc:cxnChg>
+        <pc:cxnChg chg="mod">
+          <ac:chgData name="Massimo Cappelli" userId="683e3799-a29a-42d8-9057-94b17eae4db3" providerId="ADAL" clId="{F43C46D6-B015-4FAD-804D-7D5EF1E1C2CB}" dt="2025-06-24T09:06:40.575" v="391" actId="108"/>
+          <ac:cxnSpMkLst>
+            <pc:docMk/>
+            <pc:sldMk cId="2079438367" sldId="257"/>
+            <ac:cxnSpMk id="14" creationId="{DE48DE7B-ADFD-80FF-A1F2-0BD28B251AAC}"/>
+          </ac:cxnSpMkLst>
+        </pc:cxnChg>
+        <pc:cxnChg chg="mod">
+          <ac:chgData name="Massimo Cappelli" userId="683e3799-a29a-42d8-9057-94b17eae4db3" providerId="ADAL" clId="{F43C46D6-B015-4FAD-804D-7D5EF1E1C2CB}" dt="2025-06-24T09:06:40.575" v="391" actId="108"/>
+          <ac:cxnSpMkLst>
+            <pc:docMk/>
+            <pc:sldMk cId="2079438367" sldId="257"/>
+            <ac:cxnSpMk id="16" creationId="{67872F16-5103-BEFA-78CE-5340AB087E13}"/>
+          </ac:cxnSpMkLst>
+        </pc:cxnChg>
+        <pc:cxnChg chg="mod">
+          <ac:chgData name="Massimo Cappelli" userId="683e3799-a29a-42d8-9057-94b17eae4db3" providerId="ADAL" clId="{F43C46D6-B015-4FAD-804D-7D5EF1E1C2CB}" dt="2025-06-24T09:06:40.575" v="391" actId="108"/>
+          <ac:cxnSpMkLst>
+            <pc:docMk/>
+            <pc:sldMk cId="2079438367" sldId="257"/>
+            <ac:cxnSpMk id="17" creationId="{8C9032A7-0CE5-46FF-5A07-92ECDE8C4492}"/>
+          </ac:cxnSpMkLst>
+        </pc:cxnChg>
+        <pc:cxnChg chg="mod">
+          <ac:chgData name="Massimo Cappelli" userId="683e3799-a29a-42d8-9057-94b17eae4db3" providerId="ADAL" clId="{F43C46D6-B015-4FAD-804D-7D5EF1E1C2CB}" dt="2025-06-24T09:06:40.575" v="391" actId="108"/>
+          <ac:cxnSpMkLst>
+            <pc:docMk/>
+            <pc:sldMk cId="2079438367" sldId="257"/>
+            <ac:cxnSpMk id="29" creationId="{609B5AA7-6C88-0FE1-7817-D8690864AD52}"/>
+          </ac:cxnSpMkLst>
+        </pc:cxnChg>
+        <pc:cxnChg chg="mod">
+          <ac:chgData name="Massimo Cappelli" userId="683e3799-a29a-42d8-9057-94b17eae4db3" providerId="ADAL" clId="{F43C46D6-B015-4FAD-804D-7D5EF1E1C2CB}" dt="2025-06-24T09:06:40.575" v="391" actId="108"/>
+          <ac:cxnSpMkLst>
+            <pc:docMk/>
+            <pc:sldMk cId="2079438367" sldId="257"/>
+            <ac:cxnSpMk id="33" creationId="{C9CFCF30-24B6-4305-43AD-8142AEB6BFDE}"/>
+          </ac:cxnSpMkLst>
+        </pc:cxnChg>
+        <pc:cxnChg chg="mod">
+          <ac:chgData name="Massimo Cappelli" userId="683e3799-a29a-42d8-9057-94b17eae4db3" providerId="ADAL" clId="{F43C46D6-B015-4FAD-804D-7D5EF1E1C2CB}" dt="2025-06-24T09:06:40.575" v="391" actId="108"/>
+          <ac:cxnSpMkLst>
+            <pc:docMk/>
+            <pc:sldMk cId="2079438367" sldId="257"/>
+            <ac:cxnSpMk id="38" creationId="{BA2EB8C8-D305-ABE8-1475-C44F27D7A29E}"/>
+          </ac:cxnSpMkLst>
+        </pc:cxnChg>
+        <pc:cxnChg chg="mod">
+          <ac:chgData name="Massimo Cappelli" userId="683e3799-a29a-42d8-9057-94b17eae4db3" providerId="ADAL" clId="{F43C46D6-B015-4FAD-804D-7D5EF1E1C2CB}" dt="2025-06-24T09:06:40.575" v="391" actId="108"/>
+          <ac:cxnSpMkLst>
+            <pc:docMk/>
+            <pc:sldMk cId="2079438367" sldId="257"/>
+            <ac:cxnSpMk id="39" creationId="{9CFF52E9-54E0-5F3B-1567-8570B725B1AD}"/>
+          </ac:cxnSpMkLst>
+        </pc:cxnChg>
+      </pc:sldChg>
+      <pc:sldChg chg="addSp delSp modSp mod">
+        <pc:chgData name="Massimo Cappelli" userId="683e3799-a29a-42d8-9057-94b17eae4db3" providerId="ADAL" clId="{F43C46D6-B015-4FAD-804D-7D5EF1E1C2CB}" dt="2025-06-24T08:37:45.130" v="19" actId="1076"/>
+        <pc:sldMkLst>
+          <pc:docMk/>
+          <pc:sldMk cId="1566537278" sldId="259"/>
+        </pc:sldMkLst>
+        <pc:spChg chg="add del">
+          <ac:chgData name="Massimo Cappelli" userId="683e3799-a29a-42d8-9057-94b17eae4db3" providerId="ADAL" clId="{F43C46D6-B015-4FAD-804D-7D5EF1E1C2CB}" dt="2025-06-24T08:35:16.299" v="1" actId="478"/>
+          <ac:spMkLst>
+            <pc:docMk/>
+            <pc:sldMk cId="1566537278" sldId="259"/>
+            <ac:spMk id="3" creationId="{A2522F16-7571-F89F-8B3C-C0019945F7D5}"/>
+          </ac:spMkLst>
+        </pc:spChg>
+        <pc:spChg chg="add mod">
+          <ac:chgData name="Massimo Cappelli" userId="683e3799-a29a-42d8-9057-94b17eae4db3" providerId="ADAL" clId="{F43C46D6-B015-4FAD-804D-7D5EF1E1C2CB}" dt="2025-06-24T08:37:45.130" v="19" actId="1076"/>
+          <ac:spMkLst>
+            <pc:docMk/>
+            <pc:sldMk cId="1566537278" sldId="259"/>
+            <ac:spMk id="4" creationId="{5E65A41D-CCD0-3166-A54D-397BA94D8AF6}"/>
+          </ac:spMkLst>
+        </pc:spChg>
+        <pc:spChg chg="del mod">
+          <ac:chgData name="Massimo Cappelli" userId="683e3799-a29a-42d8-9057-94b17eae4db3" providerId="ADAL" clId="{F43C46D6-B015-4FAD-804D-7D5EF1E1C2CB}" dt="2025-06-24T08:37:14.284" v="7" actId="478"/>
+          <ac:spMkLst>
+            <pc:docMk/>
+            <pc:sldMk cId="1566537278" sldId="259"/>
+            <ac:spMk id="7" creationId="{28EDCB95-A6D9-B245-0A5B-33C953161DC6}"/>
+          </ac:spMkLst>
+        </pc:spChg>
+        <pc:spChg chg="mod">
+          <ac:chgData name="Massimo Cappelli" userId="683e3799-a29a-42d8-9057-94b17eae4db3" providerId="ADAL" clId="{F43C46D6-B015-4FAD-804D-7D5EF1E1C2CB}" dt="2025-06-24T08:35:24.641" v="3"/>
+          <ac:spMkLst>
+            <pc:docMk/>
+            <pc:sldMk cId="1566537278" sldId="259"/>
+            <ac:spMk id="23" creationId="{06888A6A-1158-DFA7-48C3-86DA70232439}"/>
+          </ac:spMkLst>
+        </pc:spChg>
+        <pc:cxnChg chg="mod">
+          <ac:chgData name="Massimo Cappelli" userId="683e3799-a29a-42d8-9057-94b17eae4db3" providerId="ADAL" clId="{F43C46D6-B015-4FAD-804D-7D5EF1E1C2CB}" dt="2025-06-24T08:37:45.130" v="19" actId="1076"/>
+          <ac:cxnSpMkLst>
+            <pc:docMk/>
+            <pc:sldMk cId="1566537278" sldId="259"/>
+            <ac:cxnSpMk id="15" creationId="{30563126-88C0-B133-639F-4E3C6789CA78}"/>
+          </ac:cxnSpMkLst>
+        </pc:cxnChg>
+      </pc:sldChg>
+      <pc:sldChg chg="addSp delSp modSp add mod">
+        <pc:chgData name="Massimo Cappelli" userId="683e3799-a29a-42d8-9057-94b17eae4db3" providerId="ADAL" clId="{F43C46D6-B015-4FAD-804D-7D5EF1E1C2CB}" dt="2025-06-24T08:43:21.509" v="191" actId="20577"/>
+        <pc:sldMkLst>
+          <pc:docMk/>
+          <pc:sldMk cId="3092993002" sldId="260"/>
+        </pc:sldMkLst>
+        <pc:spChg chg="add mod">
+          <ac:chgData name="Massimo Cappelli" userId="683e3799-a29a-42d8-9057-94b17eae4db3" providerId="ADAL" clId="{F43C46D6-B015-4FAD-804D-7D5EF1E1C2CB}" dt="2025-06-24T08:43:21.509" v="191" actId="20577"/>
+          <ac:spMkLst>
+            <pc:docMk/>
+            <pc:sldMk cId="3092993002" sldId="260"/>
+            <ac:spMk id="4" creationId="{FD0F40F9-B05A-7C18-38BD-446F25D64F41}"/>
+          </ac:spMkLst>
+        </pc:spChg>
+        <pc:spChg chg="del">
+          <ac:chgData name="Massimo Cappelli" userId="683e3799-a29a-42d8-9057-94b17eae4db3" providerId="ADAL" clId="{F43C46D6-B015-4FAD-804D-7D5EF1E1C2CB}" dt="2025-06-24T08:38:28.747" v="21" actId="478"/>
+          <ac:spMkLst>
+            <pc:docMk/>
+            <pc:sldMk cId="3092993002" sldId="260"/>
+            <ac:spMk id="9" creationId="{7D361273-CD5D-5767-94E8-E71FD8E114FB}"/>
+          </ac:spMkLst>
+        </pc:spChg>
+        <pc:spChg chg="del">
+          <ac:chgData name="Massimo Cappelli" userId="683e3799-a29a-42d8-9057-94b17eae4db3" providerId="ADAL" clId="{F43C46D6-B015-4FAD-804D-7D5EF1E1C2CB}" dt="2025-06-24T08:38:28.747" v="21" actId="478"/>
+          <ac:spMkLst>
+            <pc:docMk/>
+            <pc:sldMk cId="3092993002" sldId="260"/>
+            <ac:spMk id="10" creationId="{32E46342-A2B7-A5E0-5206-184B976FD828}"/>
+          </ac:spMkLst>
+        </pc:spChg>
+        <pc:spChg chg="del">
+          <ac:chgData name="Massimo Cappelli" userId="683e3799-a29a-42d8-9057-94b17eae4db3" providerId="ADAL" clId="{F43C46D6-B015-4FAD-804D-7D5EF1E1C2CB}" dt="2025-06-24T08:38:28.747" v="21" actId="478"/>
+          <ac:spMkLst>
+            <pc:docMk/>
+            <pc:sldMk cId="3092993002" sldId="260"/>
+            <ac:spMk id="11" creationId="{4CB84F12-4418-5850-52C3-A0AD5831FAEA}"/>
+          </ac:spMkLst>
+        </pc:spChg>
+        <pc:spChg chg="del">
+          <ac:chgData name="Massimo Cappelli" userId="683e3799-a29a-42d8-9057-94b17eae4db3" providerId="ADAL" clId="{F43C46D6-B015-4FAD-804D-7D5EF1E1C2CB}" dt="2025-06-24T08:38:28.747" v="21" actId="478"/>
+          <ac:spMkLst>
+            <pc:docMk/>
+            <pc:sldMk cId="3092993002" sldId="260"/>
+            <ac:spMk id="18" creationId="{706DFC33-4E3F-232C-9C68-C7864A283A5C}"/>
+          </ac:spMkLst>
+        </pc:spChg>
+        <pc:spChg chg="del">
+          <ac:chgData name="Massimo Cappelli" userId="683e3799-a29a-42d8-9057-94b17eae4db3" providerId="ADAL" clId="{F43C46D6-B015-4FAD-804D-7D5EF1E1C2CB}" dt="2025-06-24T08:38:28.747" v="21" actId="478"/>
+          <ac:spMkLst>
+            <pc:docMk/>
+            <pc:sldMk cId="3092993002" sldId="260"/>
+            <ac:spMk id="20" creationId="{455FF59F-09D8-8ABE-4EC6-AAA199E81A71}"/>
+          </ac:spMkLst>
+        </pc:spChg>
+        <pc:spChg chg="del">
+          <ac:chgData name="Massimo Cappelli" userId="683e3799-a29a-42d8-9057-94b17eae4db3" providerId="ADAL" clId="{F43C46D6-B015-4FAD-804D-7D5EF1E1C2CB}" dt="2025-06-24T08:38:28.747" v="21" actId="478"/>
+          <ac:spMkLst>
+            <pc:docMk/>
+            <pc:sldMk cId="3092993002" sldId="260"/>
+            <ac:spMk id="23" creationId="{E3A73D7E-1589-E339-0871-5D317C4D3FCE}"/>
+          </ac:spMkLst>
+        </pc:spChg>
+        <pc:spChg chg="del">
+          <ac:chgData name="Massimo Cappelli" userId="683e3799-a29a-42d8-9057-94b17eae4db3" providerId="ADAL" clId="{F43C46D6-B015-4FAD-804D-7D5EF1E1C2CB}" dt="2025-06-24T08:38:28.747" v="21" actId="478"/>
+          <ac:spMkLst>
+            <pc:docMk/>
+            <pc:sldMk cId="3092993002" sldId="260"/>
+            <ac:spMk id="26" creationId="{402808A7-1880-1497-D857-5AE1BD0675BF}"/>
+          </ac:spMkLst>
+        </pc:spChg>
+        <pc:cxnChg chg="del mod">
+          <ac:chgData name="Massimo Cappelli" userId="683e3799-a29a-42d8-9057-94b17eae4db3" providerId="ADAL" clId="{F43C46D6-B015-4FAD-804D-7D5EF1E1C2CB}" dt="2025-06-24T08:38:28.747" v="21" actId="478"/>
+          <ac:cxnSpMkLst>
+            <pc:docMk/>
+            <pc:sldMk cId="3092993002" sldId="260"/>
+            <ac:cxnSpMk id="13" creationId="{9A07CF03-8AB2-17B3-420C-B6F5015C1F31}"/>
+          </ac:cxnSpMkLst>
+        </pc:cxnChg>
+        <pc:cxnChg chg="del mod">
+          <ac:chgData name="Massimo Cappelli" userId="683e3799-a29a-42d8-9057-94b17eae4db3" providerId="ADAL" clId="{F43C46D6-B015-4FAD-804D-7D5EF1E1C2CB}" dt="2025-06-24T08:38:28.747" v="21" actId="478"/>
+          <ac:cxnSpMkLst>
+            <pc:docMk/>
+            <pc:sldMk cId="3092993002" sldId="260"/>
+            <ac:cxnSpMk id="14" creationId="{DE48DE7B-ADFD-80FF-A1F2-0BD28B251AAC}"/>
+          </ac:cxnSpMkLst>
+        </pc:cxnChg>
+        <pc:cxnChg chg="del mod">
+          <ac:chgData name="Massimo Cappelli" userId="683e3799-a29a-42d8-9057-94b17eae4db3" providerId="ADAL" clId="{F43C46D6-B015-4FAD-804D-7D5EF1E1C2CB}" dt="2025-06-24T08:38:28.747" v="21" actId="478"/>
+          <ac:cxnSpMkLst>
+            <pc:docMk/>
+            <pc:sldMk cId="3092993002" sldId="260"/>
+            <ac:cxnSpMk id="16" creationId="{67872F16-5103-BEFA-78CE-5340AB087E13}"/>
+          </ac:cxnSpMkLst>
+        </pc:cxnChg>
+        <pc:cxnChg chg="del mod">
+          <ac:chgData name="Massimo Cappelli" userId="683e3799-a29a-42d8-9057-94b17eae4db3" providerId="ADAL" clId="{F43C46D6-B015-4FAD-804D-7D5EF1E1C2CB}" dt="2025-06-24T08:38:28.747" v="21" actId="478"/>
+          <ac:cxnSpMkLst>
+            <pc:docMk/>
+            <pc:sldMk cId="3092993002" sldId="260"/>
+            <ac:cxnSpMk id="17" creationId="{8C9032A7-0CE5-46FF-5A07-92ECDE8C4492}"/>
+          </ac:cxnSpMkLst>
+        </pc:cxnChg>
+        <pc:cxnChg chg="del mod">
+          <ac:chgData name="Massimo Cappelli" userId="683e3799-a29a-42d8-9057-94b17eae4db3" providerId="ADAL" clId="{F43C46D6-B015-4FAD-804D-7D5EF1E1C2CB}" dt="2025-06-24T08:38:28.747" v="21" actId="478"/>
+          <ac:cxnSpMkLst>
+            <pc:docMk/>
+            <pc:sldMk cId="3092993002" sldId="260"/>
+            <ac:cxnSpMk id="29" creationId="{609B5AA7-6C88-0FE1-7817-D8690864AD52}"/>
+          </ac:cxnSpMkLst>
+        </pc:cxnChg>
+        <pc:cxnChg chg="del mod">
+          <ac:chgData name="Massimo Cappelli" userId="683e3799-a29a-42d8-9057-94b17eae4db3" providerId="ADAL" clId="{F43C46D6-B015-4FAD-804D-7D5EF1E1C2CB}" dt="2025-06-24T08:38:28.747" v="21" actId="478"/>
+          <ac:cxnSpMkLst>
+            <pc:docMk/>
+            <pc:sldMk cId="3092993002" sldId="260"/>
+            <ac:cxnSpMk id="33" creationId="{C9CFCF30-24B6-4305-43AD-8142AEB6BFDE}"/>
+          </ac:cxnSpMkLst>
+        </pc:cxnChg>
+        <pc:cxnChg chg="del mod">
+          <ac:chgData name="Massimo Cappelli" userId="683e3799-a29a-42d8-9057-94b17eae4db3" providerId="ADAL" clId="{F43C46D6-B015-4FAD-804D-7D5EF1E1C2CB}" dt="2025-06-24T08:38:28.747" v="21" actId="478"/>
+          <ac:cxnSpMkLst>
+            <pc:docMk/>
+            <pc:sldMk cId="3092993002" sldId="260"/>
+            <ac:cxnSpMk id="38" creationId="{BA2EB8C8-D305-ABE8-1475-C44F27D7A29E}"/>
+          </ac:cxnSpMkLst>
+        </pc:cxnChg>
+        <pc:cxnChg chg="del mod">
+          <ac:chgData name="Massimo Cappelli" userId="683e3799-a29a-42d8-9057-94b17eae4db3" providerId="ADAL" clId="{F43C46D6-B015-4FAD-804D-7D5EF1E1C2CB}" dt="2025-06-24T08:38:28.747" v="21" actId="478"/>
+          <ac:cxnSpMkLst>
+            <pc:docMk/>
+            <pc:sldMk cId="3092993002" sldId="260"/>
+            <ac:cxnSpMk id="39" creationId="{9CFF52E9-54E0-5F3B-1567-8570B725B1AD}"/>
+          </ac:cxnSpMkLst>
+        </pc:cxnChg>
+      </pc:sldChg>
+      <pc:sldChg chg="modSp add mod">
+        <pc:chgData name="Massimo Cappelli" userId="683e3799-a29a-42d8-9057-94b17eae4db3" providerId="ADAL" clId="{F43C46D6-B015-4FAD-804D-7D5EF1E1C2CB}" dt="2025-06-24T08:49:14.514" v="386" actId="113"/>
+        <pc:sldMkLst>
+          <pc:docMk/>
+          <pc:sldMk cId="2716649881" sldId="261"/>
+        </pc:sldMkLst>
+        <pc:spChg chg="mod">
+          <ac:chgData name="Massimo Cappelli" userId="683e3799-a29a-42d8-9057-94b17eae4db3" providerId="ADAL" clId="{F43C46D6-B015-4FAD-804D-7D5EF1E1C2CB}" dt="2025-06-24T08:49:14.514" v="386" actId="113"/>
+          <ac:spMkLst>
+            <pc:docMk/>
+            <pc:sldMk cId="2716649881" sldId="261"/>
+            <ac:spMk id="4" creationId="{FD0F40F9-B05A-7C18-38BD-446F25D64F41}"/>
+          </ac:spMkLst>
+        </pc:spChg>
+      </pc:sldChg>
+    </pc:docChg>
+  </pc:docChgLst>
   <pc:docChgLst>
     <pc:chgData name="Massimo Cappelli" userId="aec1770f7978cf65" providerId="LiveId" clId="{34C09F10-C780-4E93-9DFA-357151B02302}"/>
     <pc:docChg chg="undo custSel addSld delSld modSld sldOrd">
@@ -968,7 +1303,7 @@
           <a:p>
             <a:fld id="{3605EF2C-06C6-4DE6-A8AF-96983C0636BB}" type="datetimeFigureOut">
               <a:rPr lang="en-GB" smtClean="0"/>
-              <a:t>22/06/2025</a:t>
+              <a:t>24/06/2025</a:t>
             </a:fld>
             <a:endParaRPr lang="en-GB"/>
           </a:p>
@@ -1168,7 +1503,7 @@
           <a:p>
             <a:fld id="{3605EF2C-06C6-4DE6-A8AF-96983C0636BB}" type="datetimeFigureOut">
               <a:rPr lang="en-GB" smtClean="0"/>
-              <a:t>22/06/2025</a:t>
+              <a:t>24/06/2025</a:t>
             </a:fld>
             <a:endParaRPr lang="en-GB"/>
           </a:p>
@@ -1378,7 +1713,7 @@
           <a:p>
             <a:fld id="{3605EF2C-06C6-4DE6-A8AF-96983C0636BB}" type="datetimeFigureOut">
               <a:rPr lang="en-GB" smtClean="0"/>
-              <a:t>22/06/2025</a:t>
+              <a:t>24/06/2025</a:t>
             </a:fld>
             <a:endParaRPr lang="en-GB"/>
           </a:p>
@@ -1578,7 +1913,7 @@
           <a:p>
             <a:fld id="{3605EF2C-06C6-4DE6-A8AF-96983C0636BB}" type="datetimeFigureOut">
               <a:rPr lang="en-GB" smtClean="0"/>
-              <a:t>22/06/2025</a:t>
+              <a:t>24/06/2025</a:t>
             </a:fld>
             <a:endParaRPr lang="en-GB"/>
           </a:p>
@@ -1854,7 +2189,7 @@
           <a:p>
             <a:fld id="{3605EF2C-06C6-4DE6-A8AF-96983C0636BB}" type="datetimeFigureOut">
               <a:rPr lang="en-GB" smtClean="0"/>
-              <a:t>22/06/2025</a:t>
+              <a:t>24/06/2025</a:t>
             </a:fld>
             <a:endParaRPr lang="en-GB"/>
           </a:p>
@@ -2122,7 +2457,7 @@
           <a:p>
             <a:fld id="{3605EF2C-06C6-4DE6-A8AF-96983C0636BB}" type="datetimeFigureOut">
               <a:rPr lang="en-GB" smtClean="0"/>
-              <a:t>22/06/2025</a:t>
+              <a:t>24/06/2025</a:t>
             </a:fld>
             <a:endParaRPr lang="en-GB"/>
           </a:p>
@@ -2537,7 +2872,7 @@
           <a:p>
             <a:fld id="{3605EF2C-06C6-4DE6-A8AF-96983C0636BB}" type="datetimeFigureOut">
               <a:rPr lang="en-GB" smtClean="0"/>
-              <a:t>22/06/2025</a:t>
+              <a:t>24/06/2025</a:t>
             </a:fld>
             <a:endParaRPr lang="en-GB"/>
           </a:p>
@@ -2679,7 +3014,7 @@
           <a:p>
             <a:fld id="{3605EF2C-06C6-4DE6-A8AF-96983C0636BB}" type="datetimeFigureOut">
               <a:rPr lang="en-GB" smtClean="0"/>
-              <a:t>22/06/2025</a:t>
+              <a:t>24/06/2025</a:t>
             </a:fld>
             <a:endParaRPr lang="en-GB"/>
           </a:p>
@@ -2792,7 +3127,7 @@
           <a:p>
             <a:fld id="{3605EF2C-06C6-4DE6-A8AF-96983C0636BB}" type="datetimeFigureOut">
               <a:rPr lang="en-GB" smtClean="0"/>
-              <a:t>22/06/2025</a:t>
+              <a:t>24/06/2025</a:t>
             </a:fld>
             <a:endParaRPr lang="en-GB"/>
           </a:p>
@@ -3105,7 +3440,7 @@
           <a:p>
             <a:fld id="{3605EF2C-06C6-4DE6-A8AF-96983C0636BB}" type="datetimeFigureOut">
               <a:rPr lang="en-GB" smtClean="0"/>
-              <a:t>22/06/2025</a:t>
+              <a:t>24/06/2025</a:t>
             </a:fld>
             <a:endParaRPr lang="en-GB"/>
           </a:p>
@@ -3394,7 +3729,7 @@
           <a:p>
             <a:fld id="{3605EF2C-06C6-4DE6-A8AF-96983C0636BB}" type="datetimeFigureOut">
               <a:rPr lang="en-GB" smtClean="0"/>
-              <a:t>22/06/2025</a:t>
+              <a:t>24/06/2025</a:t>
             </a:fld>
             <a:endParaRPr lang="en-GB"/>
           </a:p>
@@ -3637,7 +3972,7 @@
           <a:p>
             <a:fld id="{3605EF2C-06C6-4DE6-A8AF-96983C0636BB}" type="datetimeFigureOut">
               <a:rPr lang="en-GB" smtClean="0"/>
-              <a:t>22/06/2025</a:t>
+              <a:t>24/06/2025</a:t>
             </a:fld>
             <a:endParaRPr lang="en-GB"/>
           </a:p>
@@ -4790,63 +5125,6 @@
           </a:p>
         </p:txBody>
       </p:sp>
-      <p:sp>
-        <p:nvSpPr>
-          <p:cNvPr id="7" name="Flowchart: Process 6">
-            <a:extLst>
-              <a:ext uri="{FF2B5EF4-FFF2-40B4-BE49-F238E27FC236}">
-                <a16:creationId xmlns:a16="http://schemas.microsoft.com/office/drawing/2014/main" id="{28EDCB95-A6D9-B245-0A5B-33C953161DC6}"/>
-              </a:ext>
-            </a:extLst>
-          </p:cNvPr>
-          <p:cNvSpPr/>
-          <p:nvPr/>
-        </p:nvSpPr>
-        <p:spPr>
-          <a:xfrm>
-            <a:off x="2231571" y="694670"/>
-            <a:ext cx="1654629" cy="646565"/>
-          </a:xfrm>
-          <a:prstGeom prst="flowChartProcess">
-            <a:avLst/>
-          </a:prstGeom>
-          <a:solidFill>
-            <a:srgbClr val="0070C0"/>
-          </a:solidFill>
-          <a:ln w="38100">
-            <a:solidFill>
-              <a:schemeClr val="bg2"/>
-            </a:solidFill>
-          </a:ln>
-        </p:spPr>
-        <p:style>
-          <a:lnRef idx="2">
-            <a:schemeClr val="accent1">
-              <a:shade val="15000"/>
-            </a:schemeClr>
-          </a:lnRef>
-          <a:fillRef idx="1">
-            <a:schemeClr val="accent1"/>
-          </a:fillRef>
-          <a:effectRef idx="0">
-            <a:schemeClr val="accent1"/>
-          </a:effectRef>
-          <a:fontRef idx="minor">
-            <a:schemeClr val="lt1"/>
-          </a:fontRef>
-        </p:style>
-        <p:txBody>
-          <a:bodyPr rtlCol="0" anchor="ctr"/>
-          <a:lstStyle/>
-          <a:p>
-            <a:pPr algn="ctr"/>
-            <a:r>
-              <a:rPr lang="en-GB" dirty="0"/>
-              <a:t>Select Mode</a:t>
-            </a:r>
-          </a:p>
-        </p:txBody>
-      </p:sp>
       <p:cxnSp>
         <p:nvCxnSpPr>
           <p:cNvPr id="13" name="Straight Arrow Connector 12">
@@ -4943,6 +5221,10 @@
           <a:lstStyle/>
           <a:p>
             <a:pPr algn="ctr"/>
+            <a:r>
+              <a:rPr lang="en-GB" sz="1200"/>
+              <a:t>Select Mode</a:t>
+            </a:r>
             <a:endParaRPr lang="en-GB" sz="1200" dirty="0"/>
           </a:p>
         </p:txBody>
@@ -4958,15 +5240,15 @@
           </p:cNvPr>
           <p:cNvCxnSpPr>
             <a:cxnSpLocks/>
-            <a:stCxn id="7" idx="2"/>
+            <a:stCxn id="4" idx="2"/>
             <a:endCxn id="23" idx="0"/>
           </p:cNvCxnSpPr>
           <p:nvPr/>
         </p:nvCxnSpPr>
         <p:spPr>
           <a:xfrm>
-            <a:off x="3058886" y="1341235"/>
-            <a:ext cx="0" cy="442009"/>
+            <a:off x="3048000" y="1320461"/>
+            <a:ext cx="10886" cy="462783"/>
           </a:xfrm>
           <a:prstGeom prst="straightConnector1">
             <a:avLst/>
@@ -5554,6 +5836,63 @@
           </a:fontRef>
         </p:style>
       </p:cxnSp>
+      <p:sp>
+        <p:nvSpPr>
+          <p:cNvPr id="4" name="Flowchart: Terminator 3">
+            <a:extLst>
+              <a:ext uri="{FF2B5EF4-FFF2-40B4-BE49-F238E27FC236}">
+                <a16:creationId xmlns:a16="http://schemas.microsoft.com/office/drawing/2014/main" id="{5E65A41D-CCD0-3166-A54D-397BA94D8AF6}"/>
+              </a:ext>
+            </a:extLst>
+          </p:cNvPr>
+          <p:cNvSpPr/>
+          <p:nvPr/>
+        </p:nvSpPr>
+        <p:spPr>
+          <a:xfrm>
+            <a:off x="2293620" y="756280"/>
+            <a:ext cx="1508760" cy="564181"/>
+          </a:xfrm>
+          <a:prstGeom prst="flowChartTerminator">
+            <a:avLst/>
+          </a:prstGeom>
+          <a:solidFill>
+            <a:srgbClr val="0070C0"/>
+          </a:solidFill>
+          <a:ln w="38100">
+            <a:solidFill>
+              <a:schemeClr val="bg2"/>
+            </a:solidFill>
+          </a:ln>
+        </p:spPr>
+        <p:style>
+          <a:lnRef idx="2">
+            <a:schemeClr val="accent1">
+              <a:shade val="15000"/>
+            </a:schemeClr>
+          </a:lnRef>
+          <a:fillRef idx="1">
+            <a:schemeClr val="accent1"/>
+          </a:fillRef>
+          <a:effectRef idx="0">
+            <a:schemeClr val="accent1"/>
+          </a:effectRef>
+          <a:fontRef idx="minor">
+            <a:schemeClr val="lt1"/>
+          </a:fontRef>
+        </p:style>
+        <p:txBody>
+          <a:bodyPr rtlCol="0" anchor="ctr"/>
+          <a:lstStyle/>
+          <a:p>
+            <a:pPr algn="ctr"/>
+            <a:r>
+              <a:rPr lang="en-US" dirty="0"/>
+              <a:t>Start</a:t>
+            </a:r>
+          </a:p>
+        </p:txBody>
+      </p:sp>
     </p:spTree>
     <p:extLst>
       <p:ext uri="{BB962C8B-B14F-4D97-AF65-F5344CB8AC3E}">
@@ -5722,6 +6061,14 @@
           <a:prstGeom prst="flowChartProcess">
             <a:avLst/>
           </a:prstGeom>
+          <a:solidFill>
+            <a:srgbClr val="0070C0"/>
+          </a:solidFill>
+          <a:ln w="38100">
+            <a:solidFill>
+              <a:schemeClr val="bg2"/>
+            </a:solidFill>
+          </a:ln>
         </p:spPr>
         <p:style>
           <a:lnRef idx="2">
@@ -5745,10 +6092,10 @@
           <a:p>
             <a:pPr algn="ctr"/>
             <a:r>
-              <a:rPr lang="en-GB" dirty="0" err="1"/>
+              <a:rPr lang="en-GB" sz="1200"/>
               <a:t>updateGameBoard</a:t>
             </a:r>
-            <a:endParaRPr lang="en-GB" dirty="0"/>
+            <a:endParaRPr lang="en-GB" sz="1200" dirty="0"/>
           </a:p>
         </p:txBody>
       </p:sp>
@@ -5772,6 +6119,14 @@
           <a:prstGeom prst="flowChartDecision">
             <a:avLst/>
           </a:prstGeom>
+          <a:solidFill>
+            <a:srgbClr val="0070C0"/>
+          </a:solidFill>
+          <a:ln w="38100">
+            <a:solidFill>
+              <a:schemeClr val="bg2"/>
+            </a:solidFill>
+          </a:ln>
         </p:spPr>
         <p:style>
           <a:lnRef idx="2">
@@ -5795,7 +6150,7 @@
           <a:p>
             <a:pPr algn="ctr"/>
             <a:r>
-              <a:rPr lang="en-GB" sz="1200" dirty="0" err="1"/>
+              <a:rPr lang="en-GB" sz="1200"/>
               <a:t>checkGameStatus</a:t>
             </a:r>
             <a:endParaRPr lang="en-GB" sz="1200" dirty="0"/>
@@ -5822,6 +6177,14 @@
           <a:prstGeom prst="flowChartProcess">
             <a:avLst/>
           </a:prstGeom>
+          <a:solidFill>
+            <a:srgbClr val="0070C0"/>
+          </a:solidFill>
+          <a:ln w="38100">
+            <a:solidFill>
+              <a:schemeClr val="bg2"/>
+            </a:solidFill>
+          </a:ln>
         </p:spPr>
         <p:style>
           <a:lnRef idx="2">
@@ -5845,10 +6208,10 @@
           <a:p>
             <a:pPr algn="ctr"/>
             <a:r>
-              <a:rPr lang="en-GB" dirty="0" err="1"/>
+              <a:rPr lang="en-GB" sz="1200"/>
               <a:t>updateGameBoard</a:t>
             </a:r>
-            <a:endParaRPr lang="en-GB" dirty="0"/>
+            <a:endParaRPr lang="en-GB" sz="1200" dirty="0"/>
           </a:p>
         </p:txBody>
       </p:sp>
@@ -5876,22 +6239,29 @@
           <a:prstGeom prst="straightConnector1">
             <a:avLst/>
           </a:prstGeom>
+          <a:solidFill>
+            <a:srgbClr val="0070C0"/>
+          </a:solidFill>
           <a:ln w="38100">
-            <a:tailEnd type="triangle"/>
+            <a:solidFill>
+              <a:schemeClr val="bg2"/>
+            </a:solidFill>
           </a:ln>
         </p:spPr>
         <p:style>
           <a:lnRef idx="2">
-            <a:schemeClr val="accent1"/>
+            <a:schemeClr val="accent1">
+              <a:shade val="15000"/>
+            </a:schemeClr>
           </a:lnRef>
-          <a:fillRef idx="0">
+          <a:fillRef idx="1">
             <a:schemeClr val="accent1"/>
           </a:fillRef>
-          <a:effectRef idx="1">
+          <a:effectRef idx="0">
             <a:schemeClr val="accent1"/>
           </a:effectRef>
           <a:fontRef idx="minor">
-            <a:schemeClr val="tx1"/>
+            <a:schemeClr val="lt1"/>
           </a:fontRef>
         </p:style>
       </p:cxnSp>
@@ -5919,22 +6289,29 @@
           <a:prstGeom prst="straightConnector1">
             <a:avLst/>
           </a:prstGeom>
+          <a:solidFill>
+            <a:srgbClr val="0070C0"/>
+          </a:solidFill>
           <a:ln w="38100">
-            <a:tailEnd type="triangle"/>
+            <a:solidFill>
+              <a:schemeClr val="bg2"/>
+            </a:solidFill>
           </a:ln>
         </p:spPr>
         <p:style>
           <a:lnRef idx="2">
-            <a:schemeClr val="accent1"/>
+            <a:schemeClr val="accent1">
+              <a:shade val="15000"/>
+            </a:schemeClr>
           </a:lnRef>
-          <a:fillRef idx="0">
+          <a:fillRef idx="1">
             <a:schemeClr val="accent1"/>
           </a:fillRef>
-          <a:effectRef idx="1">
+          <a:effectRef idx="0">
             <a:schemeClr val="accent1"/>
           </a:effectRef>
           <a:fontRef idx="minor">
-            <a:schemeClr val="tx1"/>
+            <a:schemeClr val="lt1"/>
           </a:fontRef>
         </p:style>
       </p:cxnSp>
@@ -5962,22 +6339,29 @@
           <a:prstGeom prst="straightConnector1">
             <a:avLst/>
           </a:prstGeom>
+          <a:solidFill>
+            <a:srgbClr val="0070C0"/>
+          </a:solidFill>
           <a:ln w="38100">
-            <a:tailEnd type="triangle"/>
+            <a:solidFill>
+              <a:schemeClr val="bg2"/>
+            </a:solidFill>
           </a:ln>
         </p:spPr>
         <p:style>
           <a:lnRef idx="2">
-            <a:schemeClr val="accent1"/>
+            <a:schemeClr val="accent1">
+              <a:shade val="15000"/>
+            </a:schemeClr>
           </a:lnRef>
-          <a:fillRef idx="0">
+          <a:fillRef idx="1">
             <a:schemeClr val="accent1"/>
           </a:fillRef>
-          <a:effectRef idx="1">
+          <a:effectRef idx="0">
             <a:schemeClr val="accent1"/>
           </a:effectRef>
           <a:fontRef idx="minor">
-            <a:schemeClr val="tx1"/>
+            <a:schemeClr val="lt1"/>
           </a:fontRef>
         </p:style>
       </p:cxnSp>
@@ -6001,6 +6385,14 @@
           <a:prstGeom prst="flowChartProcess">
             <a:avLst/>
           </a:prstGeom>
+          <a:solidFill>
+            <a:srgbClr val="0070C0"/>
+          </a:solidFill>
+          <a:ln w="38100">
+            <a:solidFill>
+              <a:schemeClr val="bg2"/>
+            </a:solidFill>
+          </a:ln>
         </p:spPr>
         <p:style>
           <a:lnRef idx="2">
@@ -6024,10 +6416,10 @@
           <a:p>
             <a:pPr algn="ctr"/>
             <a:r>
-              <a:rPr lang="en-GB" sz="1600" dirty="0" err="1"/>
+              <a:rPr lang="en-GB" sz="1200"/>
               <a:t>saveGameStats</a:t>
             </a:r>
-            <a:endParaRPr lang="en-GB" sz="1600" dirty="0"/>
+            <a:endParaRPr lang="en-GB" sz="1200" dirty="0"/>
           </a:p>
         </p:txBody>
       </p:sp>
@@ -6051,6 +6443,14 @@
           <a:prstGeom prst="flowChartDecision">
             <a:avLst/>
           </a:prstGeom>
+          <a:solidFill>
+            <a:srgbClr val="0070C0"/>
+          </a:solidFill>
+          <a:ln w="38100">
+            <a:solidFill>
+              <a:schemeClr val="bg2"/>
+            </a:solidFill>
+          </a:ln>
         </p:spPr>
         <p:style>
           <a:lnRef idx="2">
@@ -6074,7 +6474,7 @@
           <a:p>
             <a:pPr algn="ctr"/>
             <a:r>
-              <a:rPr lang="en-GB" sz="1200" dirty="0" err="1"/>
+              <a:rPr lang="en-GB" sz="1200"/>
               <a:t>checkValidMove</a:t>
             </a:r>
             <a:endParaRPr lang="en-GB" sz="1200" dirty="0"/>
@@ -6105,22 +6505,29 @@
           <a:prstGeom prst="straightConnector1">
             <a:avLst/>
           </a:prstGeom>
+          <a:solidFill>
+            <a:srgbClr val="0070C0"/>
+          </a:solidFill>
           <a:ln w="38100">
-            <a:tailEnd type="triangle"/>
+            <a:solidFill>
+              <a:schemeClr val="bg2"/>
+            </a:solidFill>
           </a:ln>
         </p:spPr>
         <p:style>
           <a:lnRef idx="2">
-            <a:schemeClr val="accent1"/>
+            <a:schemeClr val="accent1">
+              <a:shade val="15000"/>
+            </a:schemeClr>
           </a:lnRef>
-          <a:fillRef idx="0">
+          <a:fillRef idx="1">
             <a:schemeClr val="accent1"/>
           </a:fillRef>
-          <a:effectRef idx="1">
+          <a:effectRef idx="0">
             <a:schemeClr val="accent1"/>
           </a:effectRef>
           <a:fontRef idx="minor">
-            <a:schemeClr val="tx1"/>
+            <a:schemeClr val="lt1"/>
           </a:fontRef>
         </p:style>
       </p:cxnSp>
@@ -6135,35 +6542,40 @@
           </p:cNvPr>
           <p:cNvCxnSpPr>
             <a:cxnSpLocks/>
-            <a:stCxn id="11" idx="1"/>
-            <a:endCxn id="18" idx="2"/>
           </p:cNvCxnSpPr>
           <p:nvPr/>
         </p:nvCxnSpPr>
         <p:spPr>
           <a:xfrm rot="10800000">
-            <a:off x="967020" y="1535738"/>
+            <a:off x="967020" y="1540252"/>
             <a:ext cx="1654628" cy="4322246"/>
           </a:xfrm>
           <a:prstGeom prst="bentConnector2">
             <a:avLst/>
           </a:prstGeom>
-          <a:ln w="28575">
-            <a:tailEnd type="triangle"/>
+          <a:solidFill>
+            <a:srgbClr val="0070C0"/>
+          </a:solidFill>
+          <a:ln w="38100">
+            <a:solidFill>
+              <a:schemeClr val="bg2"/>
+            </a:solidFill>
           </a:ln>
         </p:spPr>
         <p:style>
           <a:lnRef idx="2">
-            <a:schemeClr val="accent1"/>
+            <a:schemeClr val="accent1">
+              <a:shade val="15000"/>
+            </a:schemeClr>
           </a:lnRef>
-          <a:fillRef idx="0">
+          <a:fillRef idx="1">
             <a:schemeClr val="accent1"/>
           </a:fillRef>
-          <a:effectRef idx="1">
+          <a:effectRef idx="0">
             <a:schemeClr val="accent1"/>
           </a:effectRef>
           <a:fontRef idx="minor">
-            <a:schemeClr val="tx1"/>
+            <a:schemeClr val="lt1"/>
           </a:fontRef>
         </p:style>
       </p:cxnSp>
@@ -6187,6 +6599,14 @@
           <a:prstGeom prst="flowChartDecision">
             <a:avLst/>
           </a:prstGeom>
+          <a:solidFill>
+            <a:srgbClr val="0070C0"/>
+          </a:solidFill>
+          <a:ln w="38100">
+            <a:solidFill>
+              <a:schemeClr val="bg2"/>
+            </a:solidFill>
+          </a:ln>
         </p:spPr>
         <p:style>
           <a:lnRef idx="2">
@@ -6210,7 +6630,7 @@
           <a:p>
             <a:pPr algn="ctr"/>
             <a:r>
-              <a:rPr lang="en-GB" sz="1200" dirty="0" err="1"/>
+              <a:rPr lang="en-GB" sz="1200"/>
               <a:t>checkPlayerTurn</a:t>
             </a:r>
             <a:endParaRPr lang="en-GB" sz="1200" dirty="0"/>
@@ -6237,6 +6657,14 @@
           <a:prstGeom prst="flowChartProcess">
             <a:avLst/>
           </a:prstGeom>
+          <a:solidFill>
+            <a:srgbClr val="0070C0"/>
+          </a:solidFill>
+          <a:ln w="38100">
+            <a:solidFill>
+              <a:schemeClr val="bg2"/>
+            </a:solidFill>
+          </a:ln>
         </p:spPr>
         <p:style>
           <a:lnRef idx="2">
@@ -6260,7 +6688,7 @@
           <a:p>
             <a:pPr algn="ctr"/>
             <a:r>
-              <a:rPr lang="en-GB" dirty="0"/>
+              <a:rPr lang="en-GB" sz="1200" dirty="0"/>
               <a:t>Select move</a:t>
             </a:r>
           </a:p>
@@ -6290,22 +6718,29 @@
           <a:prstGeom prst="straightConnector1">
             <a:avLst/>
           </a:prstGeom>
+          <a:solidFill>
+            <a:srgbClr val="0070C0"/>
+          </a:solidFill>
           <a:ln w="38100">
-            <a:tailEnd type="triangle"/>
+            <a:solidFill>
+              <a:schemeClr val="bg2"/>
+            </a:solidFill>
           </a:ln>
         </p:spPr>
         <p:style>
           <a:lnRef idx="2">
-            <a:schemeClr val="accent1"/>
+            <a:schemeClr val="accent1">
+              <a:shade val="15000"/>
+            </a:schemeClr>
           </a:lnRef>
-          <a:fillRef idx="0">
+          <a:fillRef idx="1">
             <a:schemeClr val="accent1"/>
           </a:fillRef>
-          <a:effectRef idx="1">
+          <a:effectRef idx="0">
             <a:schemeClr val="accent1"/>
           </a:effectRef>
           <a:fontRef idx="minor">
-            <a:schemeClr val="tx1"/>
+            <a:schemeClr val="lt1"/>
           </a:fontRef>
         </p:style>
       </p:cxnSp>
@@ -6333,22 +6768,29 @@
           <a:prstGeom prst="straightConnector1">
             <a:avLst/>
           </a:prstGeom>
+          <a:solidFill>
+            <a:srgbClr val="0070C0"/>
+          </a:solidFill>
           <a:ln w="38100">
-            <a:tailEnd type="triangle"/>
+            <a:solidFill>
+              <a:schemeClr val="bg2"/>
+            </a:solidFill>
           </a:ln>
         </p:spPr>
         <p:style>
           <a:lnRef idx="2">
-            <a:schemeClr val="accent1"/>
+            <a:schemeClr val="accent1">
+              <a:shade val="15000"/>
+            </a:schemeClr>
           </a:lnRef>
-          <a:fillRef idx="0">
+          <a:fillRef idx="1">
             <a:schemeClr val="accent1"/>
           </a:fillRef>
-          <a:effectRef idx="1">
+          <a:effectRef idx="0">
             <a:schemeClr val="accent1"/>
           </a:effectRef>
           <a:fontRef idx="minor">
-            <a:schemeClr val="tx1"/>
+            <a:schemeClr val="lt1"/>
           </a:fontRef>
         </p:style>
       </p:cxnSp>
@@ -6378,22 +6820,29 @@
               <a:gd name="adj1" fmla="val 3514283"/>
             </a:avLst>
           </a:prstGeom>
-          <a:ln w="28575">
-            <a:tailEnd type="triangle"/>
+          <a:solidFill>
+            <a:srgbClr val="0070C0"/>
+          </a:solidFill>
+          <a:ln w="38100">
+            <a:solidFill>
+              <a:schemeClr val="bg2"/>
+            </a:solidFill>
           </a:ln>
         </p:spPr>
         <p:style>
           <a:lnRef idx="2">
-            <a:schemeClr val="accent1"/>
+            <a:schemeClr val="accent1">
+              <a:shade val="15000"/>
+            </a:schemeClr>
           </a:lnRef>
-          <a:fillRef idx="0">
+          <a:fillRef idx="1">
             <a:schemeClr val="accent1"/>
           </a:fillRef>
-          <a:effectRef idx="1">
+          <a:effectRef idx="0">
             <a:schemeClr val="accent1"/>
           </a:effectRef>
           <a:fontRef idx="minor">
-            <a:schemeClr val="tx1"/>
+            <a:schemeClr val="lt1"/>
           </a:fontRef>
         </p:style>
       </p:cxnSp>
@@ -6411,6 +6860,959 @@
 </file>
 
 <file path=ppt/slides/slide4.xml><?xml version="1.0" encoding="utf-8"?>
+<p:sld xmlns:a="http://schemas.openxmlformats.org/drawingml/2006/main" xmlns:r="http://schemas.openxmlformats.org/officeDocument/2006/relationships" xmlns:p="http://schemas.openxmlformats.org/presentationml/2006/main">
+  <p:cSld>
+    <p:spTree>
+      <p:nvGrpSpPr>
+        <p:cNvPr id="1" name=""/>
+        <p:cNvGrpSpPr/>
+        <p:nvPr/>
+      </p:nvGrpSpPr>
+      <p:grpSpPr>
+        <a:xfrm>
+          <a:off x="0" y="0"/>
+          <a:ext cx="0" cy="0"/>
+          <a:chOff x="0" y="0"/>
+          <a:chExt cx="0" cy="0"/>
+        </a:xfrm>
+      </p:grpSpPr>
+      <p:pic>
+        <p:nvPicPr>
+          <p:cNvPr id="3" name="Picture 2" descr="Python And Artificial Intelligence">
+            <a:extLst>
+              <a:ext uri="{FF2B5EF4-FFF2-40B4-BE49-F238E27FC236}">
+                <a16:creationId xmlns:a16="http://schemas.microsoft.com/office/drawing/2014/main" id="{7201A34C-1DF2-C52C-2086-34ABC70D03C5}"/>
+              </a:ext>
+            </a:extLst>
+          </p:cNvPr>
+          <p:cNvPicPr>
+            <a:picLocks noChangeAspect="1" noChangeArrowheads="1"/>
+          </p:cNvPicPr>
+          <p:nvPr/>
+        </p:nvPicPr>
+        <p:blipFill>
+          <a:blip r:embed="rId2">
+            <a:extLst>
+              <a:ext uri="{28A0092B-C50C-407E-A947-70E740481C1C}">
+                <a14:useLocalDpi xmlns:a14="http://schemas.microsoft.com/office/drawing/2010/main" val="0"/>
+              </a:ext>
+            </a:extLst>
+          </a:blip>
+          <a:srcRect/>
+          <a:stretch>
+            <a:fillRect/>
+          </a:stretch>
+        </p:blipFill>
+        <p:spPr bwMode="auto">
+          <a:xfrm>
+            <a:off x="3048000" y="108856"/>
+            <a:ext cx="9080494" cy="6662057"/>
+          </a:xfrm>
+          <a:prstGeom prst="rect">
+            <a:avLst/>
+          </a:prstGeom>
+          <a:noFill/>
+          <a:ln w="38100">
+            <a:solidFill>
+              <a:schemeClr val="bg1"/>
+            </a:solidFill>
+          </a:ln>
+          <a:extLst>
+            <a:ext uri="{909E8E84-426E-40DD-AFC4-6F175D3DCCD1}">
+              <a14:hiddenFill xmlns:a14="http://schemas.microsoft.com/office/drawing/2010/main">
+                <a:solidFill>
+                  <a:srgbClr val="FFFFFF"/>
+                </a:solidFill>
+              </a14:hiddenFill>
+            </a:ext>
+          </a:extLst>
+        </p:spPr>
+      </p:pic>
+      <p:sp>
+        <p:nvSpPr>
+          <p:cNvPr id="2" name="Title 1">
+            <a:extLst>
+              <a:ext uri="{FF2B5EF4-FFF2-40B4-BE49-F238E27FC236}">
+                <a16:creationId xmlns:a16="http://schemas.microsoft.com/office/drawing/2014/main" id="{04E071A2-A519-FC06-86B5-6603C886A841}"/>
+              </a:ext>
+            </a:extLst>
+          </p:cNvPr>
+          <p:cNvSpPr>
+            <a:spLocks noGrp="1"/>
+          </p:cNvSpPr>
+          <p:nvPr>
+            <p:ph type="title"/>
+          </p:nvPr>
+        </p:nvSpPr>
+        <p:spPr>
+          <a:xfrm>
+            <a:off x="5018314" y="1122081"/>
+            <a:ext cx="6368143" cy="378985"/>
+          </a:xfrm>
+          <a:effectLst>
+            <a:reflection blurRad="6350" stA="50000" endA="300" endPos="90000" dir="5400000" sy="-100000" algn="bl" rotWithShape="0"/>
+          </a:effectLst>
+        </p:spPr>
+        <p:txBody>
+          <a:bodyPr>
+            <a:normAutofit fontScale="90000"/>
+          </a:bodyPr>
+          <a:lstStyle/>
+          <a:p>
+            <a:pPr algn="r"/>
+            <a:r>
+              <a:rPr lang="en-GB" b="1" dirty="0" err="1">
+                <a:ln w="22225">
+                  <a:solidFill>
+                    <a:schemeClr val="accent2"/>
+                  </a:solidFill>
+                  <a:prstDash val="solid"/>
+                </a:ln>
+                <a:solidFill>
+                  <a:schemeClr val="accent2">
+                    <a:lumMod val="40000"/>
+                    <a:lumOff val="60000"/>
+                  </a:schemeClr>
+                </a:solidFill>
+              </a:rPr>
+              <a:t>TicTacToe</a:t>
+            </a:r>
+            <a:endParaRPr lang="en-GB" b="1" dirty="0">
+              <a:ln w="22225">
+                <a:solidFill>
+                  <a:schemeClr val="accent2"/>
+                </a:solidFill>
+                <a:prstDash val="solid"/>
+              </a:ln>
+              <a:solidFill>
+                <a:schemeClr val="accent2">
+                  <a:lumMod val="40000"/>
+                  <a:lumOff val="60000"/>
+                </a:schemeClr>
+              </a:solidFill>
+            </a:endParaRPr>
+          </a:p>
+        </p:txBody>
+      </p:sp>
+      <mc:AlternateContent xmlns:mc="http://schemas.openxmlformats.org/markup-compatibility/2006">
+        <mc:Choice xmlns:a14="http://schemas.microsoft.com/office/drawing/2010/main" Requires="a14">
+          <p:sp>
+            <p:nvSpPr>
+              <p:cNvPr id="4" name="TextBox 3">
+                <a:extLst>
+                  <a:ext uri="{FF2B5EF4-FFF2-40B4-BE49-F238E27FC236}">
+                    <a16:creationId xmlns:a16="http://schemas.microsoft.com/office/drawing/2014/main" id="{FD0F40F9-B05A-7C18-38BD-446F25D64F41}"/>
+                  </a:ext>
+                </a:extLst>
+              </p:cNvPr>
+              <p:cNvSpPr txBox="1"/>
+              <p:nvPr/>
+            </p:nvSpPr>
+            <p:spPr>
+              <a:xfrm>
+                <a:off x="91440" y="192024"/>
+                <a:ext cx="2798064" cy="4724948"/>
+              </a:xfrm>
+              <a:prstGeom prst="rect">
+                <a:avLst/>
+              </a:prstGeom>
+              <a:noFill/>
+            </p:spPr>
+            <p:txBody>
+              <a:bodyPr wrap="square" rtlCol="0">
+                <a:spAutoFit/>
+              </a:bodyPr>
+              <a:lstStyle/>
+              <a:p>
+                <a:endParaRPr lang="en-US" dirty="0"/>
+              </a:p>
+              <a:p>
+                <a:r>
+                  <a:rPr lang="en-US" dirty="0" err="1"/>
+                  <a:t>TicTacToe</a:t>
+                </a:r>
+                <a:r>
+                  <a:rPr lang="en-US" dirty="0"/>
+                  <a:t> represent a basic game built over a 2D 3x3 Matrix.</a:t>
+                </a:r>
+              </a:p>
+              <a:p>
+                <a:endParaRPr lang="en-US" dirty="0"/>
+              </a:p>
+              <a:p>
+                <a14:m>
+                  <m:oMathPara xmlns:m="http://schemas.openxmlformats.org/officeDocument/2006/math">
+                    <m:oMathParaPr>
+                      <m:jc m:val="centerGroup"/>
+                    </m:oMathParaPr>
+                    <m:oMath xmlns:m="http://schemas.openxmlformats.org/officeDocument/2006/math">
+                      <m:r>
+                        <a:rPr lang="en-US" i="1" smtClean="0">
+                          <a:latin typeface="Cambria Math" panose="02040503050406030204" pitchFamily="18" charset="0"/>
+                        </a:rPr>
+                        <m:t>𝐴</m:t>
+                      </m:r>
+                      <m:r>
+                        <a:rPr lang="en-US" i="1" smtClean="0">
+                          <a:latin typeface="Cambria Math" panose="02040503050406030204" pitchFamily="18" charset="0"/>
+                        </a:rPr>
+                        <m:t>=</m:t>
+                      </m:r>
+                      <m:m>
+                        <m:mPr>
+                          <m:mcs>
+                            <m:mc>
+                              <m:mcPr>
+                                <m:count m:val="3"/>
+                                <m:mcJc m:val="center"/>
+                              </m:mcPr>
+                            </m:mc>
+                          </m:mcs>
+                          <m:ctrlPr>
+                            <a:rPr lang="en-US" i="1" smtClean="0">
+                              <a:latin typeface="Cambria Math" panose="02040503050406030204" pitchFamily="18" charset="0"/>
+                            </a:rPr>
+                          </m:ctrlPr>
+                        </m:mPr>
+                        <m:mr>
+                          <m:e/>
+                          <m:e/>
+                          <m:e/>
+                        </m:mr>
+                        <m:mr>
+                          <m:e/>
+                          <m:e/>
+                          <m:e/>
+                        </m:mr>
+                        <m:mr>
+                          <m:e/>
+                          <m:e/>
+                          <m:e/>
+                        </m:mr>
+                      </m:m>
+                    </m:oMath>
+                  </m:oMathPara>
+                </a14:m>
+                <a:endParaRPr lang="en-US" dirty="0"/>
+              </a:p>
+              <a:p>
+                <a:endParaRPr lang="en-US" dirty="0"/>
+              </a:p>
+              <a:p>
+                <a:r>
+                  <a:rPr lang="en-US" dirty="0"/>
+                  <a:t>Max Number of computation possible considering a draw:</a:t>
+                </a:r>
+              </a:p>
+              <a:p>
+                <a:endParaRPr lang="en-US" dirty="0"/>
+              </a:p>
+              <a:p>
+                <a14:m>
+                  <m:oMathPara xmlns:m="http://schemas.openxmlformats.org/officeDocument/2006/math">
+                    <m:oMathParaPr>
+                      <m:jc m:val="centerGroup"/>
+                    </m:oMathParaPr>
+                    <m:oMath xmlns:m="http://schemas.openxmlformats.org/officeDocument/2006/math">
+                      <m:r>
+                        <a:rPr lang="en-US" b="0" i="1" smtClean="0">
+                          <a:latin typeface="Cambria Math" panose="02040503050406030204" pitchFamily="18" charset="0"/>
+                        </a:rPr>
+                        <m:t>9!</m:t>
+                      </m:r>
+                      <m:r>
+                        <a:rPr lang="en-US" i="1" smtClean="0">
+                          <a:latin typeface="Cambria Math" panose="02040503050406030204" pitchFamily="18" charset="0"/>
+                        </a:rPr>
+                        <m:t>=</m:t>
+                      </m:r>
+                      <m:r>
+                        <a:rPr lang="en-US" i="1">
+                          <a:latin typeface="Cambria Math" panose="02040503050406030204" pitchFamily="18" charset="0"/>
+                        </a:rPr>
+                        <m:t>362,880</m:t>
+                      </m:r>
+                    </m:oMath>
+                  </m:oMathPara>
+                </a14:m>
+                <a:endParaRPr lang="en-US" b="0" dirty="0"/>
+              </a:p>
+              <a:p>
+                <a:endParaRPr lang="en-US" b="0" dirty="0"/>
+              </a:p>
+              <a:p>
+                <a:endParaRPr lang="en-US" dirty="0"/>
+              </a:p>
+              <a:p>
+                <a:endParaRPr lang="en-US" dirty="0"/>
+              </a:p>
+            </p:txBody>
+          </p:sp>
+        </mc:Choice>
+        <mc:Fallback>
+          <p:sp>
+            <p:nvSpPr>
+              <p:cNvPr id="4" name="TextBox 3">
+                <a:extLst>
+                  <a:ext uri="{FF2B5EF4-FFF2-40B4-BE49-F238E27FC236}">
+                    <a16:creationId xmlns:a16="http://schemas.microsoft.com/office/drawing/2014/main" id="{FD0F40F9-B05A-7C18-38BD-446F25D64F41}"/>
+                  </a:ext>
+                </a:extLst>
+              </p:cNvPr>
+              <p:cNvSpPr txBox="1">
+                <a:spLocks noRot="1" noChangeAspect="1" noMove="1" noResize="1" noEditPoints="1" noAdjustHandles="1" noChangeArrowheads="1" noChangeShapeType="1" noTextEdit="1"/>
+              </p:cNvSpPr>
+              <p:nvPr/>
+            </p:nvSpPr>
+            <p:spPr>
+              <a:xfrm>
+                <a:off x="91440" y="192024"/>
+                <a:ext cx="2798064" cy="4724948"/>
+              </a:xfrm>
+              <a:prstGeom prst="rect">
+                <a:avLst/>
+              </a:prstGeom>
+              <a:blipFill>
+                <a:blip r:embed="rId3"/>
+                <a:stretch>
+                  <a:fillRect l="-1743" r="-2179"/>
+                </a:stretch>
+              </a:blipFill>
+            </p:spPr>
+            <p:txBody>
+              <a:bodyPr/>
+              <a:lstStyle/>
+              <a:p>
+                <a:r>
+                  <a:rPr lang="en-US">
+                    <a:noFill/>
+                  </a:rPr>
+                  <a:t> </a:t>
+                </a:r>
+              </a:p>
+            </p:txBody>
+          </p:sp>
+        </mc:Fallback>
+      </mc:AlternateContent>
+    </p:spTree>
+    <p:extLst>
+      <p:ext uri="{BB962C8B-B14F-4D97-AF65-F5344CB8AC3E}">
+        <p14:creationId xmlns:p14="http://schemas.microsoft.com/office/powerpoint/2010/main" val="3092993002"/>
+      </p:ext>
+    </p:extLst>
+  </p:cSld>
+  <p:clrMapOvr>
+    <a:masterClrMapping/>
+  </p:clrMapOvr>
+</p:sld>
+</file>
+
+<file path=ppt/slides/slide5.xml><?xml version="1.0" encoding="utf-8"?>
+<p:sld xmlns:a="http://schemas.openxmlformats.org/drawingml/2006/main" xmlns:r="http://schemas.openxmlformats.org/officeDocument/2006/relationships" xmlns:p="http://schemas.openxmlformats.org/presentationml/2006/main">
+  <p:cSld>
+    <p:spTree>
+      <p:nvGrpSpPr>
+        <p:cNvPr id="1" name=""/>
+        <p:cNvGrpSpPr/>
+        <p:nvPr/>
+      </p:nvGrpSpPr>
+      <p:grpSpPr>
+        <a:xfrm>
+          <a:off x="0" y="0"/>
+          <a:ext cx="0" cy="0"/>
+          <a:chOff x="0" y="0"/>
+          <a:chExt cx="0" cy="0"/>
+        </a:xfrm>
+      </p:grpSpPr>
+      <p:pic>
+        <p:nvPicPr>
+          <p:cNvPr id="3" name="Picture 2" descr="Python And Artificial Intelligence">
+            <a:extLst>
+              <a:ext uri="{FF2B5EF4-FFF2-40B4-BE49-F238E27FC236}">
+                <a16:creationId xmlns:a16="http://schemas.microsoft.com/office/drawing/2014/main" id="{7201A34C-1DF2-C52C-2086-34ABC70D03C5}"/>
+              </a:ext>
+            </a:extLst>
+          </p:cNvPr>
+          <p:cNvPicPr>
+            <a:picLocks noChangeAspect="1" noChangeArrowheads="1"/>
+          </p:cNvPicPr>
+          <p:nvPr/>
+        </p:nvPicPr>
+        <p:blipFill>
+          <a:blip r:embed="rId2">
+            <a:extLst>
+              <a:ext uri="{28A0092B-C50C-407E-A947-70E740481C1C}">
+                <a14:useLocalDpi xmlns:a14="http://schemas.microsoft.com/office/drawing/2010/main" val="0"/>
+              </a:ext>
+            </a:extLst>
+          </a:blip>
+          <a:srcRect/>
+          <a:stretch>
+            <a:fillRect/>
+          </a:stretch>
+        </p:blipFill>
+        <p:spPr bwMode="auto">
+          <a:xfrm>
+            <a:off x="3048000" y="108856"/>
+            <a:ext cx="9080494" cy="6662057"/>
+          </a:xfrm>
+          <a:prstGeom prst="rect">
+            <a:avLst/>
+          </a:prstGeom>
+          <a:noFill/>
+          <a:ln w="38100">
+            <a:solidFill>
+              <a:schemeClr val="bg1"/>
+            </a:solidFill>
+          </a:ln>
+          <a:extLst>
+            <a:ext uri="{909E8E84-426E-40DD-AFC4-6F175D3DCCD1}">
+              <a14:hiddenFill xmlns:a14="http://schemas.microsoft.com/office/drawing/2010/main">
+                <a:solidFill>
+                  <a:srgbClr val="FFFFFF"/>
+                </a:solidFill>
+              </a14:hiddenFill>
+            </a:ext>
+          </a:extLst>
+        </p:spPr>
+      </p:pic>
+      <p:sp>
+        <p:nvSpPr>
+          <p:cNvPr id="2" name="Title 1">
+            <a:extLst>
+              <a:ext uri="{FF2B5EF4-FFF2-40B4-BE49-F238E27FC236}">
+                <a16:creationId xmlns:a16="http://schemas.microsoft.com/office/drawing/2014/main" id="{04E071A2-A519-FC06-86B5-6603C886A841}"/>
+              </a:ext>
+            </a:extLst>
+          </p:cNvPr>
+          <p:cNvSpPr>
+            <a:spLocks noGrp="1"/>
+          </p:cNvSpPr>
+          <p:nvPr>
+            <p:ph type="title"/>
+          </p:nvPr>
+        </p:nvSpPr>
+        <p:spPr>
+          <a:xfrm>
+            <a:off x="5018314" y="1122081"/>
+            <a:ext cx="6368143" cy="378985"/>
+          </a:xfrm>
+          <a:effectLst>
+            <a:reflection blurRad="6350" stA="50000" endA="300" endPos="90000" dir="5400000" sy="-100000" algn="bl" rotWithShape="0"/>
+          </a:effectLst>
+        </p:spPr>
+        <p:txBody>
+          <a:bodyPr>
+            <a:normAutofit fontScale="90000"/>
+          </a:bodyPr>
+          <a:lstStyle/>
+          <a:p>
+            <a:pPr algn="r"/>
+            <a:r>
+              <a:rPr lang="en-GB" b="1" dirty="0" err="1">
+                <a:ln w="22225">
+                  <a:solidFill>
+                    <a:schemeClr val="accent2"/>
+                  </a:solidFill>
+                  <a:prstDash val="solid"/>
+                </a:ln>
+                <a:solidFill>
+                  <a:schemeClr val="accent2">
+                    <a:lumMod val="40000"/>
+                    <a:lumOff val="60000"/>
+                  </a:schemeClr>
+                </a:solidFill>
+              </a:rPr>
+              <a:t>TicTacToe</a:t>
+            </a:r>
+            <a:endParaRPr lang="en-GB" b="1" dirty="0">
+              <a:ln w="22225">
+                <a:solidFill>
+                  <a:schemeClr val="accent2"/>
+                </a:solidFill>
+                <a:prstDash val="solid"/>
+              </a:ln>
+              <a:solidFill>
+                <a:schemeClr val="accent2">
+                  <a:lumMod val="40000"/>
+                  <a:lumOff val="60000"/>
+                </a:schemeClr>
+              </a:solidFill>
+            </a:endParaRPr>
+          </a:p>
+        </p:txBody>
+      </p:sp>
+      <mc:AlternateContent xmlns:mc="http://schemas.openxmlformats.org/markup-compatibility/2006">
+        <mc:Choice xmlns:a14="http://schemas.microsoft.com/office/drawing/2010/main" Requires="a14">
+          <p:sp>
+            <p:nvSpPr>
+              <p:cNvPr id="4" name="TextBox 3">
+                <a:extLst>
+                  <a:ext uri="{FF2B5EF4-FFF2-40B4-BE49-F238E27FC236}">
+                    <a16:creationId xmlns:a16="http://schemas.microsoft.com/office/drawing/2014/main" id="{FD0F40F9-B05A-7C18-38BD-446F25D64F41}"/>
+                  </a:ext>
+                </a:extLst>
+              </p:cNvPr>
+              <p:cNvSpPr txBox="1"/>
+              <p:nvPr/>
+            </p:nvSpPr>
+            <p:spPr>
+              <a:xfrm>
+                <a:off x="91440" y="192024"/>
+                <a:ext cx="2798064" cy="6647333"/>
+              </a:xfrm>
+              <a:prstGeom prst="rect">
+                <a:avLst/>
+              </a:prstGeom>
+              <a:noFill/>
+            </p:spPr>
+            <p:txBody>
+              <a:bodyPr wrap="square" rtlCol="0">
+                <a:spAutoFit/>
+              </a:bodyPr>
+              <a:lstStyle/>
+              <a:p>
+                <a:r>
+                  <a:rPr lang="en-US" dirty="0"/>
+                  <a:t>Game Status</a:t>
+                </a:r>
+              </a:p>
+              <a:p>
+                <a:endParaRPr lang="en-US" b="0" dirty="0"/>
+              </a:p>
+              <a:p>
+                <a:pPr marL="285750" indent="-285750">
+                  <a:buFont typeface="Arial" panose="020B0604020202020204" pitchFamily="34" charset="0"/>
+                  <a:buChar char="•"/>
+                </a:pPr>
+                <a:r>
+                  <a:rPr lang="en-US" dirty="0"/>
+                  <a:t>Initial - no win no draw</a:t>
+                </a:r>
+              </a:p>
+              <a:p>
+                <a:pPr marL="285750" indent="-285750">
+                  <a:buFont typeface="Arial" panose="020B0604020202020204" pitchFamily="34" charset="0"/>
+                  <a:buChar char="•"/>
+                </a:pPr>
+                <a:r>
+                  <a:rPr lang="en-US" b="0" dirty="0"/>
+                  <a:t>Final - win or draw</a:t>
+                </a:r>
+              </a:p>
+              <a:p>
+                <a:pPr marL="285750" indent="-285750">
+                  <a:buFont typeface="Arial" panose="020B0604020202020204" pitchFamily="34" charset="0"/>
+                  <a:buChar char="•"/>
+                </a:pPr>
+                <a:endParaRPr lang="en-US" dirty="0"/>
+              </a:p>
+              <a:p>
+                <a:r>
+                  <a:rPr lang="en-US" b="0" dirty="0"/>
+                  <a:t>Type of Final status</a:t>
+                </a:r>
+              </a:p>
+              <a:p>
+                <a:endParaRPr lang="en-US" dirty="0"/>
+              </a:p>
+              <a:p>
+                <a14:m>
+                  <m:oMathPara xmlns:m="http://schemas.openxmlformats.org/officeDocument/2006/math">
+                    <m:oMathParaPr>
+                      <m:jc m:val="centerGroup"/>
+                    </m:oMathParaPr>
+                    <m:oMath xmlns:m="http://schemas.openxmlformats.org/officeDocument/2006/math">
+                      <m:r>
+                        <a:rPr lang="en-US" b="0" i="1" smtClean="0">
+                          <a:latin typeface="Cambria Math" panose="02040503050406030204" pitchFamily="18" charset="0"/>
+                        </a:rPr>
+                        <m:t>𝐻𝑊</m:t>
+                      </m:r>
+                      <m:r>
+                        <a:rPr lang="en-US" i="1" smtClean="0">
+                          <a:latin typeface="Cambria Math" panose="02040503050406030204" pitchFamily="18" charset="0"/>
+                        </a:rPr>
+                        <m:t>=</m:t>
+                      </m:r>
+                      <m:m>
+                        <m:mPr>
+                          <m:mcs>
+                            <m:mc>
+                              <m:mcPr>
+                                <m:count m:val="3"/>
+                                <m:mcJc m:val="center"/>
+                              </m:mcPr>
+                            </m:mc>
+                          </m:mcs>
+                          <m:ctrlPr>
+                            <a:rPr lang="en-US" i="1" smtClean="0">
+                              <a:latin typeface="Cambria Math" panose="02040503050406030204" pitchFamily="18" charset="0"/>
+                            </a:rPr>
+                          </m:ctrlPr>
+                        </m:mPr>
+                        <m:mr>
+                          <m:e>
+                            <m:r>
+                              <m:rPr>
+                                <m:brk m:alnAt="7"/>
+                              </m:rPr>
+                              <a:rPr lang="en-US" b="0" i="1" smtClean="0">
+                                <a:latin typeface="Cambria Math" panose="02040503050406030204" pitchFamily="18" charset="0"/>
+                              </a:rPr>
+                              <m:t>𝑥</m:t>
+                            </m:r>
+                          </m:e>
+                          <m:e>
+                            <m:r>
+                              <a:rPr lang="en-US" b="0" i="1" smtClean="0">
+                                <a:latin typeface="Cambria Math" panose="02040503050406030204" pitchFamily="18" charset="0"/>
+                              </a:rPr>
+                              <m:t>𝑥</m:t>
+                            </m:r>
+                          </m:e>
+                          <m:e>
+                            <m:r>
+                              <a:rPr lang="en-US" b="0" i="1" smtClean="0">
+                                <a:latin typeface="Cambria Math" panose="02040503050406030204" pitchFamily="18" charset="0"/>
+                              </a:rPr>
+                              <m:t>𝑥</m:t>
+                            </m:r>
+                          </m:e>
+                        </m:mr>
+                        <m:mr>
+                          <m:e/>
+                          <m:e/>
+                          <m:e/>
+                        </m:mr>
+                        <m:mr>
+                          <m:e/>
+                          <m:e/>
+                          <m:e/>
+                        </m:mr>
+                      </m:m>
+                    </m:oMath>
+                  </m:oMathPara>
+                </a14:m>
+                <a:endParaRPr lang="en-US" dirty="0"/>
+              </a:p>
+              <a:p>
+                <a:endParaRPr lang="en-US" b="0" dirty="0"/>
+              </a:p>
+              <a:p>
+                <a14:m>
+                  <m:oMathPara xmlns:m="http://schemas.openxmlformats.org/officeDocument/2006/math">
+                    <m:oMathParaPr>
+                      <m:jc m:val="centerGroup"/>
+                    </m:oMathParaPr>
+                    <m:oMath xmlns:m="http://schemas.openxmlformats.org/officeDocument/2006/math">
+                      <m:r>
+                        <a:rPr lang="en-US" b="0" i="1" smtClean="0">
+                          <a:latin typeface="Cambria Math" panose="02040503050406030204" pitchFamily="18" charset="0"/>
+                        </a:rPr>
+                        <m:t>𝑉𝑊</m:t>
+                      </m:r>
+                      <m:r>
+                        <a:rPr lang="en-US" i="1" smtClean="0">
+                          <a:latin typeface="Cambria Math" panose="02040503050406030204" pitchFamily="18" charset="0"/>
+                        </a:rPr>
+                        <m:t>=</m:t>
+                      </m:r>
+                      <m:m>
+                        <m:mPr>
+                          <m:mcs>
+                            <m:mc>
+                              <m:mcPr>
+                                <m:count m:val="3"/>
+                                <m:mcJc m:val="center"/>
+                              </m:mcPr>
+                            </m:mc>
+                          </m:mcs>
+                          <m:ctrlPr>
+                            <a:rPr lang="en-US" i="1" smtClean="0">
+                              <a:latin typeface="Cambria Math" panose="02040503050406030204" pitchFamily="18" charset="0"/>
+                            </a:rPr>
+                          </m:ctrlPr>
+                        </m:mPr>
+                        <m:mr>
+                          <m:e>
+                            <m:r>
+                              <m:rPr>
+                                <m:brk m:alnAt="7"/>
+                              </m:rPr>
+                              <a:rPr lang="en-US" b="0" i="1" smtClean="0">
+                                <a:latin typeface="Cambria Math" panose="02040503050406030204" pitchFamily="18" charset="0"/>
+                              </a:rPr>
+                              <m:t>𝑥</m:t>
+                            </m:r>
+                          </m:e>
+                          <m:e/>
+                          <m:e/>
+                        </m:mr>
+                        <m:mr>
+                          <m:e>
+                            <m:r>
+                              <a:rPr lang="en-US" b="0" i="1" smtClean="0">
+                                <a:latin typeface="Cambria Math" panose="02040503050406030204" pitchFamily="18" charset="0"/>
+                              </a:rPr>
+                              <m:t>𝑥</m:t>
+                            </m:r>
+                          </m:e>
+                          <m:e/>
+                          <m:e/>
+                        </m:mr>
+                        <m:mr>
+                          <m:e>
+                            <m:r>
+                              <a:rPr lang="en-US" b="0" i="1" smtClean="0">
+                                <a:latin typeface="Cambria Math" panose="02040503050406030204" pitchFamily="18" charset="0"/>
+                              </a:rPr>
+                              <m:t>𝑥</m:t>
+                            </m:r>
+                          </m:e>
+                          <m:e/>
+                          <m:e/>
+                        </m:mr>
+                      </m:m>
+                    </m:oMath>
+                  </m:oMathPara>
+                </a14:m>
+                <a:endParaRPr lang="en-US" dirty="0"/>
+              </a:p>
+              <a:p>
+                <a:endParaRPr lang="en-US" dirty="0"/>
+              </a:p>
+              <a:p>
+                <a14:m>
+                  <m:oMathPara xmlns:m="http://schemas.openxmlformats.org/officeDocument/2006/math">
+                    <m:oMathParaPr>
+                      <m:jc m:val="centerGroup"/>
+                    </m:oMathParaPr>
+                    <m:oMath xmlns:m="http://schemas.openxmlformats.org/officeDocument/2006/math">
+                      <m:r>
+                        <a:rPr lang="en-US" b="0" i="1" smtClean="0">
+                          <a:latin typeface="Cambria Math" panose="02040503050406030204" pitchFamily="18" charset="0"/>
+                        </a:rPr>
+                        <m:t>𝐷</m:t>
+                      </m:r>
+                      <m:r>
+                        <a:rPr lang="en-US" b="0" i="1" smtClean="0">
+                          <a:latin typeface="Cambria Math" panose="02040503050406030204" pitchFamily="18" charset="0"/>
+                        </a:rPr>
+                        <m:t>1=</m:t>
+                      </m:r>
+                      <m:m>
+                        <m:mPr>
+                          <m:mcs>
+                            <m:mc>
+                              <m:mcPr>
+                                <m:count m:val="3"/>
+                                <m:mcJc m:val="center"/>
+                              </m:mcPr>
+                            </m:mc>
+                          </m:mcs>
+                          <m:ctrlPr>
+                            <a:rPr lang="en-US" i="1" smtClean="0">
+                              <a:latin typeface="Cambria Math" panose="02040503050406030204" pitchFamily="18" charset="0"/>
+                            </a:rPr>
+                          </m:ctrlPr>
+                        </m:mPr>
+                        <m:mr>
+                          <m:e>
+                            <m:r>
+                              <m:rPr>
+                                <m:brk m:alnAt="7"/>
+                              </m:rPr>
+                              <a:rPr lang="en-US" b="0" i="1" smtClean="0">
+                                <a:latin typeface="Cambria Math" panose="02040503050406030204" pitchFamily="18" charset="0"/>
+                              </a:rPr>
+                              <m:t>𝑥</m:t>
+                            </m:r>
+                          </m:e>
+                          <m:e/>
+                          <m:e/>
+                        </m:mr>
+                        <m:mr>
+                          <m:e/>
+                          <m:e>
+                            <m:r>
+                              <a:rPr lang="en-US" b="0" i="1" smtClean="0">
+                                <a:latin typeface="Cambria Math" panose="02040503050406030204" pitchFamily="18" charset="0"/>
+                              </a:rPr>
+                              <m:t>𝑥</m:t>
+                            </m:r>
+                          </m:e>
+                          <m:e/>
+                        </m:mr>
+                        <m:mr>
+                          <m:e/>
+                          <m:e/>
+                          <m:e>
+                            <m:r>
+                              <a:rPr lang="en-US" b="0" i="1" smtClean="0">
+                                <a:latin typeface="Cambria Math" panose="02040503050406030204" pitchFamily="18" charset="0"/>
+                              </a:rPr>
+                              <m:t>𝑥</m:t>
+                            </m:r>
+                          </m:e>
+                        </m:mr>
+                      </m:m>
+                    </m:oMath>
+                  </m:oMathPara>
+                </a14:m>
+                <a:endParaRPr lang="en-US" dirty="0"/>
+              </a:p>
+              <a:p>
+                <a:endParaRPr lang="en-US" b="0" dirty="0"/>
+              </a:p>
+              <a:p>
+                <a14:m>
+                  <m:oMathPara xmlns:m="http://schemas.openxmlformats.org/officeDocument/2006/math">
+                    <m:oMathParaPr>
+                      <m:jc m:val="centerGroup"/>
+                    </m:oMathParaPr>
+                    <m:oMath xmlns:m="http://schemas.openxmlformats.org/officeDocument/2006/math">
+                      <m:r>
+                        <a:rPr lang="en-US" b="0" i="1" smtClean="0">
+                          <a:latin typeface="Cambria Math" panose="02040503050406030204" pitchFamily="18" charset="0"/>
+                        </a:rPr>
+                        <m:t>𝐷</m:t>
+                      </m:r>
+                      <m:r>
+                        <a:rPr lang="en-US" b="0" i="1" smtClean="0">
+                          <a:latin typeface="Cambria Math" panose="02040503050406030204" pitchFamily="18" charset="0"/>
+                        </a:rPr>
+                        <m:t>2=</m:t>
+                      </m:r>
+                      <m:m>
+                        <m:mPr>
+                          <m:mcs>
+                            <m:mc>
+                              <m:mcPr>
+                                <m:count m:val="3"/>
+                                <m:mcJc m:val="center"/>
+                              </m:mcPr>
+                            </m:mc>
+                          </m:mcs>
+                          <m:ctrlPr>
+                            <a:rPr lang="en-US" i="1" smtClean="0">
+                              <a:latin typeface="Cambria Math" panose="02040503050406030204" pitchFamily="18" charset="0"/>
+                            </a:rPr>
+                          </m:ctrlPr>
+                        </m:mPr>
+                        <m:mr>
+                          <m:e/>
+                          <m:e/>
+                          <m:e>
+                            <m:r>
+                              <a:rPr lang="en-US" b="0" i="1" smtClean="0">
+                                <a:latin typeface="Cambria Math" panose="02040503050406030204" pitchFamily="18" charset="0"/>
+                              </a:rPr>
+                              <m:t>𝑥</m:t>
+                            </m:r>
+                          </m:e>
+                        </m:mr>
+                        <m:mr>
+                          <m:e/>
+                          <m:e>
+                            <m:r>
+                              <a:rPr lang="en-US" b="0" i="1" smtClean="0">
+                                <a:latin typeface="Cambria Math" panose="02040503050406030204" pitchFamily="18" charset="0"/>
+                              </a:rPr>
+                              <m:t>𝑥</m:t>
+                            </m:r>
+                          </m:e>
+                          <m:e/>
+                        </m:mr>
+                        <m:mr>
+                          <m:e>
+                            <m:r>
+                              <a:rPr lang="en-US" b="0" i="1" smtClean="0">
+                                <a:latin typeface="Cambria Math" panose="02040503050406030204" pitchFamily="18" charset="0"/>
+                              </a:rPr>
+                              <m:t>𝑥</m:t>
+                            </m:r>
+                          </m:e>
+                          <m:e/>
+                          <m:e/>
+                        </m:mr>
+                      </m:m>
+                    </m:oMath>
+                  </m:oMathPara>
+                </a14:m>
+                <a:endParaRPr lang="en-US" dirty="0"/>
+              </a:p>
+              <a:p>
+                <a:endParaRPr lang="en-US" dirty="0"/>
+              </a:p>
+              <a:p>
+                <a:r>
+                  <a:rPr lang="en-US" dirty="0"/>
+                  <a:t>All spots taken but no HW, VW, D1 or D2.</a:t>
+                </a:r>
+              </a:p>
+            </p:txBody>
+          </p:sp>
+        </mc:Choice>
+        <mc:Fallback>
+          <p:sp>
+            <p:nvSpPr>
+              <p:cNvPr id="4" name="TextBox 3">
+                <a:extLst>
+                  <a:ext uri="{FF2B5EF4-FFF2-40B4-BE49-F238E27FC236}">
+                    <a16:creationId xmlns:a16="http://schemas.microsoft.com/office/drawing/2014/main" id="{FD0F40F9-B05A-7C18-38BD-446F25D64F41}"/>
+                  </a:ext>
+                </a:extLst>
+              </p:cNvPr>
+              <p:cNvSpPr txBox="1">
+                <a:spLocks noRot="1" noChangeAspect="1" noMove="1" noResize="1" noEditPoints="1" noAdjustHandles="1" noChangeArrowheads="1" noChangeShapeType="1" noTextEdit="1"/>
+              </p:cNvSpPr>
+              <p:nvPr/>
+            </p:nvSpPr>
+            <p:spPr>
+              <a:xfrm>
+                <a:off x="91440" y="192024"/>
+                <a:ext cx="2798064" cy="6647333"/>
+              </a:xfrm>
+              <a:prstGeom prst="rect">
+                <a:avLst/>
+              </a:prstGeom>
+              <a:blipFill>
+                <a:blip r:embed="rId3"/>
+                <a:stretch>
+                  <a:fillRect l="-1743" t="-459" r="-1961" b="-550"/>
+                </a:stretch>
+              </a:blipFill>
+            </p:spPr>
+            <p:txBody>
+              <a:bodyPr/>
+              <a:lstStyle/>
+              <a:p>
+                <a:r>
+                  <a:rPr lang="en-US">
+                    <a:noFill/>
+                  </a:rPr>
+                  <a:t> </a:t>
+                </a:r>
+              </a:p>
+            </p:txBody>
+          </p:sp>
+        </mc:Fallback>
+      </mc:AlternateContent>
+    </p:spTree>
+    <p:extLst>
+      <p:ext uri="{BB962C8B-B14F-4D97-AF65-F5344CB8AC3E}">
+        <p14:creationId xmlns:p14="http://schemas.microsoft.com/office/powerpoint/2010/main" val="2716649881"/>
+      </p:ext>
+    </p:extLst>
+  </p:cSld>
+  <p:clrMapOvr>
+    <a:masterClrMapping/>
+  </p:clrMapOvr>
+</p:sld>
+</file>
+
+<file path=ppt/slides/slide6.xml><?xml version="1.0" encoding="utf-8"?>
 <p:sld xmlns:a="http://schemas.openxmlformats.org/drawingml/2006/main" xmlns:r="http://schemas.openxmlformats.org/officeDocument/2006/relationships" xmlns:p="http://schemas.openxmlformats.org/presentationml/2006/main">
   <p:cSld>
     <p:spTree>

</xml_diff>